<commit_message>
core chapter 4 comments
</commit_message>
<xml_diff>
--- a/Chapter_3/chapter_3_flowchart.pptx
+++ b/Chapter_3/chapter_3_flowchart.pptx
@@ -245,7 +245,7 @@
           <a:p>
             <a:fld id="{A6117092-E7AF-4EA9-8EF8-4BE065EEE782}" type="datetimeFigureOut">
               <a:rPr lang="en-AU" smtClean="0"/>
-              <a:t>3/06/2025</a:t>
+              <a:t>5/06/2025</a:t>
             </a:fld>
             <a:endParaRPr lang="en-AU"/>
           </a:p>
@@ -415,7 +415,7 @@
           <a:p>
             <a:fld id="{A6117092-E7AF-4EA9-8EF8-4BE065EEE782}" type="datetimeFigureOut">
               <a:rPr lang="en-AU" smtClean="0"/>
-              <a:t>3/06/2025</a:t>
+              <a:t>5/06/2025</a:t>
             </a:fld>
             <a:endParaRPr lang="en-AU"/>
           </a:p>
@@ -595,7 +595,7 @@
           <a:p>
             <a:fld id="{A6117092-E7AF-4EA9-8EF8-4BE065EEE782}" type="datetimeFigureOut">
               <a:rPr lang="en-AU" smtClean="0"/>
-              <a:t>3/06/2025</a:t>
+              <a:t>5/06/2025</a:t>
             </a:fld>
             <a:endParaRPr lang="en-AU"/>
           </a:p>
@@ -765,7 +765,7 @@
           <a:p>
             <a:fld id="{A6117092-E7AF-4EA9-8EF8-4BE065EEE782}" type="datetimeFigureOut">
               <a:rPr lang="en-AU" smtClean="0"/>
-              <a:t>3/06/2025</a:t>
+              <a:t>5/06/2025</a:t>
             </a:fld>
             <a:endParaRPr lang="en-AU"/>
           </a:p>
@@ -1011,7 +1011,7 @@
           <a:p>
             <a:fld id="{A6117092-E7AF-4EA9-8EF8-4BE065EEE782}" type="datetimeFigureOut">
               <a:rPr lang="en-AU" smtClean="0"/>
-              <a:t>3/06/2025</a:t>
+              <a:t>5/06/2025</a:t>
             </a:fld>
             <a:endParaRPr lang="en-AU"/>
           </a:p>
@@ -1243,7 +1243,7 @@
           <a:p>
             <a:fld id="{A6117092-E7AF-4EA9-8EF8-4BE065EEE782}" type="datetimeFigureOut">
               <a:rPr lang="en-AU" smtClean="0"/>
-              <a:t>3/06/2025</a:t>
+              <a:t>5/06/2025</a:t>
             </a:fld>
             <a:endParaRPr lang="en-AU"/>
           </a:p>
@@ -1610,7 +1610,7 @@
           <a:p>
             <a:fld id="{A6117092-E7AF-4EA9-8EF8-4BE065EEE782}" type="datetimeFigureOut">
               <a:rPr lang="en-AU" smtClean="0"/>
-              <a:t>3/06/2025</a:t>
+              <a:t>5/06/2025</a:t>
             </a:fld>
             <a:endParaRPr lang="en-AU"/>
           </a:p>
@@ -1728,7 +1728,7 @@
           <a:p>
             <a:fld id="{A6117092-E7AF-4EA9-8EF8-4BE065EEE782}" type="datetimeFigureOut">
               <a:rPr lang="en-AU" smtClean="0"/>
-              <a:t>3/06/2025</a:t>
+              <a:t>5/06/2025</a:t>
             </a:fld>
             <a:endParaRPr lang="en-AU"/>
           </a:p>
@@ -1823,7 +1823,7 @@
           <a:p>
             <a:fld id="{A6117092-E7AF-4EA9-8EF8-4BE065EEE782}" type="datetimeFigureOut">
               <a:rPr lang="en-AU" smtClean="0"/>
-              <a:t>3/06/2025</a:t>
+              <a:t>5/06/2025</a:t>
             </a:fld>
             <a:endParaRPr lang="en-AU"/>
           </a:p>
@@ -2100,7 +2100,7 @@
           <a:p>
             <a:fld id="{A6117092-E7AF-4EA9-8EF8-4BE065EEE782}" type="datetimeFigureOut">
               <a:rPr lang="en-AU" smtClean="0"/>
-              <a:t>3/06/2025</a:t>
+              <a:t>5/06/2025</a:t>
             </a:fld>
             <a:endParaRPr lang="en-AU"/>
           </a:p>
@@ -2357,7 +2357,7 @@
           <a:p>
             <a:fld id="{A6117092-E7AF-4EA9-8EF8-4BE065EEE782}" type="datetimeFigureOut">
               <a:rPr lang="en-AU" smtClean="0"/>
-              <a:t>3/06/2025</a:t>
+              <a:t>5/06/2025</a:t>
             </a:fld>
             <a:endParaRPr lang="en-AU"/>
           </a:p>
@@ -2570,7 +2570,7 @@
           <a:p>
             <a:fld id="{A6117092-E7AF-4EA9-8EF8-4BE065EEE782}" type="datetimeFigureOut">
               <a:rPr lang="en-AU" smtClean="0"/>
-              <a:t>3/06/2025</a:t>
+              <a:t>5/06/2025</a:t>
             </a:fld>
             <a:endParaRPr lang="en-AU"/>
           </a:p>

</xml_diff>

<commit_message>
added chapter 5 specification
</commit_message>
<xml_diff>
--- a/Chapter_3/chapter_3_flowchart.pptx
+++ b/Chapter_3/chapter_3_flowchart.pptx
@@ -8,6 +8,7 @@
     <p:sldId id="256" r:id="rId2"/>
     <p:sldId id="257" r:id="rId3"/>
     <p:sldId id="258" r:id="rId4"/>
+    <p:sldId id="259" r:id="rId5"/>
   </p:sldIdLst>
   <p:sldSz cx="12192000" cy="27432000"/>
   <p:notesSz cx="6858000" cy="9144000"/>
@@ -245,7 +246,7 @@
           <a:p>
             <a:fld id="{A6117092-E7AF-4EA9-8EF8-4BE065EEE782}" type="datetimeFigureOut">
               <a:rPr lang="en-AU" smtClean="0"/>
-              <a:t>5/06/2025</a:t>
+              <a:t>6/06/2025</a:t>
             </a:fld>
             <a:endParaRPr lang="en-AU"/>
           </a:p>
@@ -415,7 +416,7 @@
           <a:p>
             <a:fld id="{A6117092-E7AF-4EA9-8EF8-4BE065EEE782}" type="datetimeFigureOut">
               <a:rPr lang="en-AU" smtClean="0"/>
-              <a:t>5/06/2025</a:t>
+              <a:t>6/06/2025</a:t>
             </a:fld>
             <a:endParaRPr lang="en-AU"/>
           </a:p>
@@ -595,7 +596,7 @@
           <a:p>
             <a:fld id="{A6117092-E7AF-4EA9-8EF8-4BE065EEE782}" type="datetimeFigureOut">
               <a:rPr lang="en-AU" smtClean="0"/>
-              <a:t>5/06/2025</a:t>
+              <a:t>6/06/2025</a:t>
             </a:fld>
             <a:endParaRPr lang="en-AU"/>
           </a:p>
@@ -765,7 +766,7 @@
           <a:p>
             <a:fld id="{A6117092-E7AF-4EA9-8EF8-4BE065EEE782}" type="datetimeFigureOut">
               <a:rPr lang="en-AU" smtClean="0"/>
-              <a:t>5/06/2025</a:t>
+              <a:t>6/06/2025</a:t>
             </a:fld>
             <a:endParaRPr lang="en-AU"/>
           </a:p>
@@ -1011,7 +1012,7 @@
           <a:p>
             <a:fld id="{A6117092-E7AF-4EA9-8EF8-4BE065EEE782}" type="datetimeFigureOut">
               <a:rPr lang="en-AU" smtClean="0"/>
-              <a:t>5/06/2025</a:t>
+              <a:t>6/06/2025</a:t>
             </a:fld>
             <a:endParaRPr lang="en-AU"/>
           </a:p>
@@ -1243,7 +1244,7 @@
           <a:p>
             <a:fld id="{A6117092-E7AF-4EA9-8EF8-4BE065EEE782}" type="datetimeFigureOut">
               <a:rPr lang="en-AU" smtClean="0"/>
-              <a:t>5/06/2025</a:t>
+              <a:t>6/06/2025</a:t>
             </a:fld>
             <a:endParaRPr lang="en-AU"/>
           </a:p>
@@ -1610,7 +1611,7 @@
           <a:p>
             <a:fld id="{A6117092-E7AF-4EA9-8EF8-4BE065EEE782}" type="datetimeFigureOut">
               <a:rPr lang="en-AU" smtClean="0"/>
-              <a:t>5/06/2025</a:t>
+              <a:t>6/06/2025</a:t>
             </a:fld>
             <a:endParaRPr lang="en-AU"/>
           </a:p>
@@ -1728,7 +1729,7 @@
           <a:p>
             <a:fld id="{A6117092-E7AF-4EA9-8EF8-4BE065EEE782}" type="datetimeFigureOut">
               <a:rPr lang="en-AU" smtClean="0"/>
-              <a:t>5/06/2025</a:t>
+              <a:t>6/06/2025</a:t>
             </a:fld>
             <a:endParaRPr lang="en-AU"/>
           </a:p>
@@ -1823,7 +1824,7 @@
           <a:p>
             <a:fld id="{A6117092-E7AF-4EA9-8EF8-4BE065EEE782}" type="datetimeFigureOut">
               <a:rPr lang="en-AU" smtClean="0"/>
-              <a:t>5/06/2025</a:t>
+              <a:t>6/06/2025</a:t>
             </a:fld>
             <a:endParaRPr lang="en-AU"/>
           </a:p>
@@ -2100,7 +2101,7 @@
           <a:p>
             <a:fld id="{A6117092-E7AF-4EA9-8EF8-4BE065EEE782}" type="datetimeFigureOut">
               <a:rPr lang="en-AU" smtClean="0"/>
-              <a:t>5/06/2025</a:t>
+              <a:t>6/06/2025</a:t>
             </a:fld>
             <a:endParaRPr lang="en-AU"/>
           </a:p>
@@ -2357,7 +2358,7 @@
           <a:p>
             <a:fld id="{A6117092-E7AF-4EA9-8EF8-4BE065EEE782}" type="datetimeFigureOut">
               <a:rPr lang="en-AU" smtClean="0"/>
-              <a:t>5/06/2025</a:t>
+              <a:t>6/06/2025</a:t>
             </a:fld>
             <a:endParaRPr lang="en-AU"/>
           </a:p>
@@ -2570,7 +2571,7 @@
           <a:p>
             <a:fld id="{A6117092-E7AF-4EA9-8EF8-4BE065EEE782}" type="datetimeFigureOut">
               <a:rPr lang="en-AU" smtClean="0"/>
-              <a:t>5/06/2025</a:t>
+              <a:t>6/06/2025</a:t>
             </a:fld>
             <a:endParaRPr lang="en-AU"/>
           </a:p>
@@ -12071,6 +12072,86 @@
     <p:extLst>
       <p:ext uri="{BB962C8B-B14F-4D97-AF65-F5344CB8AC3E}">
         <p14:creationId xmlns:p14="http://schemas.microsoft.com/office/powerpoint/2010/main" val="776752455"/>
+      </p:ext>
+    </p:extLst>
+  </p:cSld>
+  <p:clrMapOvr>
+    <a:masterClrMapping/>
+  </p:clrMapOvr>
+</p:sld>
+</file>
+
+<file path=ppt/slides/slide4.xml><?xml version="1.0" encoding="utf-8"?>
+<p:sld xmlns:a="http://schemas.openxmlformats.org/drawingml/2006/main" xmlns:r="http://schemas.openxmlformats.org/officeDocument/2006/relationships" xmlns:p="http://schemas.openxmlformats.org/presentationml/2006/main">
+  <p:cSld>
+    <p:spTree>
+      <p:nvGrpSpPr>
+        <p:cNvPr id="1" name=""/>
+        <p:cNvGrpSpPr/>
+        <p:nvPr/>
+      </p:nvGrpSpPr>
+      <p:grpSpPr>
+        <a:xfrm>
+          <a:off x="0" y="0"/>
+          <a:ext cx="0" cy="0"/>
+          <a:chOff x="0" y="0"/>
+          <a:chExt cx="0" cy="0"/>
+        </a:xfrm>
+      </p:grpSpPr>
+      <p:sp>
+        <p:nvSpPr>
+          <p:cNvPr id="2" name="Title 1">
+            <a:extLst>
+              <a:ext uri="{FF2B5EF4-FFF2-40B4-BE49-F238E27FC236}">
+                <a16:creationId xmlns:a16="http://schemas.microsoft.com/office/drawing/2014/main" id="{9EE88437-8BD7-FEBA-5059-1B0DBFE5ECA8}"/>
+              </a:ext>
+            </a:extLst>
+          </p:cNvPr>
+          <p:cNvSpPr>
+            <a:spLocks noGrp="1"/>
+          </p:cNvSpPr>
+          <p:nvPr>
+            <p:ph type="title"/>
+          </p:nvPr>
+        </p:nvSpPr>
+        <p:spPr/>
+        <p:txBody>
+          <a:bodyPr/>
+          <a:lstStyle/>
+          <a:p>
+            <a:endParaRPr lang="en-AU"/>
+          </a:p>
+        </p:txBody>
+      </p:sp>
+      <p:sp>
+        <p:nvSpPr>
+          <p:cNvPr id="3" name="Content Placeholder 2">
+            <a:extLst>
+              <a:ext uri="{FF2B5EF4-FFF2-40B4-BE49-F238E27FC236}">
+                <a16:creationId xmlns:a16="http://schemas.microsoft.com/office/drawing/2014/main" id="{A508BBDE-BFE3-C633-A826-80552C55ED53}"/>
+              </a:ext>
+            </a:extLst>
+          </p:cNvPr>
+          <p:cNvSpPr>
+            <a:spLocks noGrp="1"/>
+          </p:cNvSpPr>
+          <p:nvPr>
+            <p:ph idx="1"/>
+          </p:nvPr>
+        </p:nvSpPr>
+        <p:spPr/>
+        <p:txBody>
+          <a:bodyPr/>
+          <a:lstStyle/>
+          <a:p>
+            <a:endParaRPr lang="en-AU"/>
+          </a:p>
+        </p:txBody>
+      </p:sp>
+    </p:spTree>
+    <p:extLst>
+      <p:ext uri="{BB962C8B-B14F-4D97-AF65-F5344CB8AC3E}">
+        <p14:creationId xmlns:p14="http://schemas.microsoft.com/office/powerpoint/2010/main" val="3339481134"/>
       </p:ext>
     </p:extLst>
   </p:cSld>

</xml_diff>